<commit_message>
script with pca correction
</commit_message>
<xml_diff>
--- a/submission/XXXXXXXX-FamilyName/Presentation/PresentationStructure.pptx
+++ b/submission/XXXXXXXX-FamilyName/Presentation/PresentationStructure.pptx
@@ -8909,7 +8909,7 @@
           <a:p>
             <a:fld id="{DAE16BD3-C27D-C54F-8EF2-BD6B1D6DF7AF}" type="datetimeFigureOut">
               <a:rPr lang="en-US" smtClean="0"/>
-              <a:t>6/5/2019</a:t>
+              <a:t>6/7/2019</a:t>
             </a:fld>
             <a:endParaRPr lang="en-US"/>
           </a:p>
@@ -9116,7 +9116,7 @@
           <a:p>
             <a:fld id="{DAE16BD3-C27D-C54F-8EF2-BD6B1D6DF7AF}" type="datetimeFigureOut">
               <a:rPr lang="en-US" smtClean="0"/>
-              <a:t>6/5/2019</a:t>
+              <a:t>6/7/2019</a:t>
             </a:fld>
             <a:endParaRPr lang="en-US"/>
           </a:p>
@@ -9296,7 +9296,7 @@
           <a:p>
             <a:fld id="{DAE16BD3-C27D-C54F-8EF2-BD6B1D6DF7AF}" type="datetimeFigureOut">
               <a:rPr lang="en-US" smtClean="0"/>
-              <a:t>6/5/2019</a:t>
+              <a:t>6/7/2019</a:t>
             </a:fld>
             <a:endParaRPr lang="en-US"/>
           </a:p>
@@ -9501,7 +9501,7 @@
           <a:p>
             <a:fld id="{DAE16BD3-C27D-C54F-8EF2-BD6B1D6DF7AF}" type="datetimeFigureOut">
               <a:rPr lang="en-US" smtClean="0"/>
-              <a:t>6/5/2019</a:t>
+              <a:t>6/7/2019</a:t>
             </a:fld>
             <a:endParaRPr lang="en-US"/>
           </a:p>
@@ -18399,7 +18399,7 @@
           <a:p>
             <a:fld id="{DAE16BD3-C27D-C54F-8EF2-BD6B1D6DF7AF}" type="datetimeFigureOut">
               <a:rPr lang="en-US" smtClean="0"/>
-              <a:t>6/5/2019</a:t>
+              <a:t>6/7/2019</a:t>
             </a:fld>
             <a:endParaRPr lang="en-US"/>
           </a:p>
@@ -18673,7 +18673,7 @@
           <a:p>
             <a:fld id="{DAE16BD3-C27D-C54F-8EF2-BD6B1D6DF7AF}" type="datetimeFigureOut">
               <a:rPr lang="en-US" smtClean="0"/>
-              <a:t>6/5/2019</a:t>
+              <a:t>6/7/2019</a:t>
             </a:fld>
             <a:endParaRPr lang="en-US"/>
           </a:p>
@@ -19071,7 +19071,7 @@
           <a:p>
             <a:fld id="{DAE16BD3-C27D-C54F-8EF2-BD6B1D6DF7AF}" type="datetimeFigureOut">
               <a:rPr lang="en-US" smtClean="0"/>
-              <a:t>6/5/2019</a:t>
+              <a:t>6/7/2019</a:t>
             </a:fld>
             <a:endParaRPr lang="en-US"/>
           </a:p>
@@ -19189,7 +19189,7 @@
           <a:p>
             <a:fld id="{DAE16BD3-C27D-C54F-8EF2-BD6B1D6DF7AF}" type="datetimeFigureOut">
               <a:rPr lang="en-US" smtClean="0"/>
-              <a:t>6/5/2019</a:t>
+              <a:t>6/7/2019</a:t>
             </a:fld>
             <a:endParaRPr lang="en-US"/>
           </a:p>
@@ -19284,7 +19284,7 @@
           <a:p>
             <a:fld id="{DAE16BD3-C27D-C54F-8EF2-BD6B1D6DF7AF}" type="datetimeFigureOut">
               <a:rPr lang="en-US" smtClean="0"/>
-              <a:t>6/5/2019</a:t>
+              <a:t>6/7/2019</a:t>
             </a:fld>
             <a:endParaRPr lang="en-US"/>
           </a:p>
@@ -19574,7 +19574,7 @@
           <a:p>
             <a:fld id="{DAE16BD3-C27D-C54F-8EF2-BD6B1D6DF7AF}" type="datetimeFigureOut">
               <a:rPr lang="en-US" smtClean="0"/>
-              <a:t>6/5/2019</a:t>
+              <a:t>6/7/2019</a:t>
             </a:fld>
             <a:endParaRPr lang="en-US"/>
           </a:p>
@@ -19854,7 +19854,7 @@
           <a:p>
             <a:fld id="{DAE16BD3-C27D-C54F-8EF2-BD6B1D6DF7AF}" type="datetimeFigureOut">
               <a:rPr lang="en-US" smtClean="0"/>
-              <a:t>6/5/2019</a:t>
+              <a:t>6/7/2019</a:t>
             </a:fld>
             <a:endParaRPr lang="en-US"/>
           </a:p>
@@ -20104,7 +20104,7 @@
           <a:p>
             <a:fld id="{DAE16BD3-C27D-C54F-8EF2-BD6B1D6DF7AF}" type="datetimeFigureOut">
               <a:rPr lang="en-US" smtClean="0"/>
-              <a:t>6/5/2019</a:t>
+              <a:t>6/7/2019</a:t>
             </a:fld>
             <a:endParaRPr lang="en-US"/>
           </a:p>
@@ -20721,7 +20721,7 @@
               <a:rPr lang="en-US" sz="3600" dirty="0">
                 <a:latin typeface="+mj-lt"/>
               </a:rPr>
-              <a:t>--- OMAR EMARA</a:t>
+              <a:t>10680562 OMAR EMARA</a:t>
             </a:r>
           </a:p>
           <a:p>
@@ -20732,6 +20732,36 @@
           </a:p>
         </p:txBody>
       </p:sp>
+      <p:pic>
+        <p:nvPicPr>
+          <p:cNvPr id="3" name="Immagine 2">
+            <a:extLst>
+              <a:ext uri="{FF2B5EF4-FFF2-40B4-BE49-F238E27FC236}">
+                <a16:creationId xmlns:a16="http://schemas.microsoft.com/office/drawing/2014/main" id="{2D891AF0-A224-4BAF-B8ED-120D1F2EEE40}"/>
+              </a:ext>
+            </a:extLst>
+          </p:cNvPr>
+          <p:cNvPicPr>
+            <a:picLocks noChangeAspect="1"/>
+          </p:cNvPicPr>
+          <p:nvPr/>
+        </p:nvPicPr>
+        <p:blipFill>
+          <a:blip r:embed="rId2"/>
+          <a:stretch>
+            <a:fillRect/>
+          </a:stretch>
+        </p:blipFill>
+        <p:spPr>
+          <a:xfrm>
+            <a:off x="7634139" y="3401567"/>
+            <a:ext cx="3732555" cy="2743203"/>
+          </a:xfrm>
+          <a:prstGeom prst="rect">
+            <a:avLst/>
+          </a:prstGeom>
+        </p:spPr>
+      </p:pic>
     </p:spTree>
     <p:extLst>
       <p:ext uri="{BB962C8B-B14F-4D97-AF65-F5344CB8AC3E}">
@@ -20783,7 +20813,15 @@
           <a:bodyPr/>
           <a:lstStyle/>
           <a:p>
-            <a:endParaRPr lang="it-IT"/>
+            <a:r>
+              <a:rPr lang="it-IT" dirty="0"/>
+              <a:t>Datasets </a:t>
+            </a:r>
+            <a:r>
+              <a:rPr lang="it-IT" dirty="0" err="1"/>
+              <a:t>manipulation</a:t>
+            </a:r>
+            <a:endParaRPr lang="it-IT" dirty="0"/>
           </a:p>
         </p:txBody>
       </p:sp>
@@ -20808,7 +20846,7 @@
           <a:bodyPr/>
           <a:lstStyle/>
           <a:p>
-            <a:endParaRPr lang="it-IT"/>
+            <a:endParaRPr lang="it-IT" dirty="0"/>
           </a:p>
         </p:txBody>
       </p:sp>
@@ -20863,7 +20901,15 @@
           <a:bodyPr/>
           <a:lstStyle/>
           <a:p>
-            <a:endParaRPr lang="it-IT"/>
+            <a:r>
+              <a:rPr lang="it-IT" dirty="0"/>
+              <a:t>Data </a:t>
+            </a:r>
+            <a:r>
+              <a:rPr lang="it-IT" dirty="0" err="1"/>
+              <a:t>preparation</a:t>
+            </a:r>
+            <a:endParaRPr lang="it-IT" dirty="0"/>
           </a:p>
         </p:txBody>
       </p:sp>
@@ -20888,7 +20934,7 @@
           <a:bodyPr/>
           <a:lstStyle/>
           <a:p>
-            <a:endParaRPr lang="it-IT"/>
+            <a:endParaRPr lang="it-IT" dirty="0"/>
           </a:p>
         </p:txBody>
       </p:sp>
@@ -20943,16 +20989,68 @@
           <a:bodyPr/>
           <a:lstStyle/>
           <a:p>
-            <a:endParaRPr lang="it-IT"/>
+            <a:r>
+              <a:rPr lang="it-IT" dirty="0" err="1"/>
+              <a:t>Lstm</a:t>
+            </a:r>
+            <a:r>
+              <a:rPr lang="it-IT" dirty="0"/>
+              <a:t> </a:t>
+            </a:r>
+            <a:r>
+              <a:rPr lang="it-IT" dirty="0" err="1"/>
+              <a:t>recurrent</a:t>
+            </a:r>
+            <a:r>
+              <a:rPr lang="it-IT" dirty="0"/>
+              <a:t> </a:t>
+            </a:r>
+            <a:r>
+              <a:rPr lang="it-IT" dirty="0" err="1"/>
+              <a:t>neural</a:t>
+            </a:r>
+            <a:r>
+              <a:rPr lang="it-IT" dirty="0"/>
+              <a:t> network</a:t>
+            </a:r>
           </a:p>
         </p:txBody>
       </p:sp>
+      <p:pic>
+        <p:nvPicPr>
+          <p:cNvPr id="8" name="Segnaposto contenuto 7">
+            <a:extLst>
+              <a:ext uri="{FF2B5EF4-FFF2-40B4-BE49-F238E27FC236}">
+                <a16:creationId xmlns:a16="http://schemas.microsoft.com/office/drawing/2014/main" id="{86CD6F72-2121-406D-B3F1-76EDEF41B90A}"/>
+              </a:ext>
+            </a:extLst>
+          </p:cNvPr>
+          <p:cNvPicPr>
+            <a:picLocks noGrp="1" noChangeAspect="1"/>
+          </p:cNvPicPr>
+          <p:nvPr>
+            <p:ph sz="half" idx="1"/>
+          </p:nvPr>
+        </p:nvPicPr>
+        <p:blipFill>
+          <a:blip r:embed="rId2"/>
+          <a:stretch>
+            <a:fillRect/>
+          </a:stretch>
+        </p:blipFill>
+        <p:spPr>
+          <a:xfrm>
+            <a:off x="6412994" y="2461846"/>
+            <a:ext cx="5160028" cy="3052688"/>
+          </a:xfrm>
+        </p:spPr>
+      </p:pic>
       <p:sp>
         <p:nvSpPr>
-          <p:cNvPr id="3" name="Segnaposto contenuto 2">
+          <p:cNvPr id="12" name="Segnaposto contenuto 11">
             <a:extLst>
               <a:ext uri="{FF2B5EF4-FFF2-40B4-BE49-F238E27FC236}">
-                <a16:creationId xmlns:a16="http://schemas.microsoft.com/office/drawing/2014/main" id="{D9FFF416-5234-4D57-81DC-460CBD6A551D}"/>
+                <a16:creationId xmlns:a16="http://schemas.microsoft.com/office/drawing/2014/main" id="{FC853D84-7E8E-4D0F-9C61-CCFADE8BDB6D}"/>
               </a:ext>
             </a:extLst>
           </p:cNvPr>
@@ -20960,15 +21058,20 @@
             <a:spLocks noGrp="1"/>
           </p:cNvSpPr>
           <p:nvPr>
-            <p:ph idx="1"/>
+            <p:ph sz="half" idx="2"/>
           </p:nvPr>
         </p:nvSpPr>
-        <p:spPr/>
+        <p:spPr>
+          <a:xfrm>
+            <a:off x="618978" y="2091866"/>
+            <a:ext cx="5160030" cy="4023360"/>
+          </a:xfrm>
+        </p:spPr>
         <p:txBody>
           <a:bodyPr/>
           <a:lstStyle/>
           <a:p>
-            <a:endParaRPr lang="it-IT"/>
+            <a:endParaRPr lang="it-IT" dirty="0"/>
           </a:p>
         </p:txBody>
       </p:sp>
@@ -21027,8 +21130,13 @@
           <a:p>
             <a:r>
               <a:rPr lang="it-IT" sz="6000" dirty="0"/>
-              <a:t>SUMMARY</a:t>
+              <a:t>SUMMARY of the </a:t>
             </a:r>
+            <a:r>
+              <a:rPr lang="it-IT" sz="6000" dirty="0" err="1"/>
+              <a:t>results</a:t>
+            </a:r>
+            <a:endParaRPr lang="it-IT" sz="6000" dirty="0"/>
           </a:p>
         </p:txBody>
       </p:sp>

</xml_diff>

<commit_message>
update presentation and notebooks finished
</commit_message>
<xml_diff>
--- a/submission/XXXXXXXX-FamilyName/Presentation/PresentationStructure.pptx
+++ b/submission/XXXXXXXX-FamilyName/Presentation/PresentationStructure.pptx
@@ -20841,12 +20841,169 @@
             <p:ph idx="1"/>
           </p:nvPr>
         </p:nvSpPr>
-        <p:spPr/>
+        <p:spPr>
+          <a:xfrm>
+            <a:off x="1024128" y="2293034"/>
+            <a:ext cx="9720073" cy="4023360"/>
+          </a:xfrm>
+        </p:spPr>
         <p:txBody>
-          <a:bodyPr/>
+          <a:bodyPr>
+            <a:normAutofit/>
+          </a:bodyPr>
           <a:lstStyle/>
           <a:p>
-            <a:endParaRPr lang="it-IT" dirty="0"/>
+            <a:pPr>
+              <a:buFont typeface="Wingdings" panose="05000000000000000000" pitchFamily="2" charset="2"/>
+              <a:buChar char="§"/>
+            </a:pPr>
+            <a:r>
+              <a:rPr lang="it-IT" sz="3200" dirty="0" err="1"/>
+              <a:t>Inspect</a:t>
+            </a:r>
+            <a:r>
+              <a:rPr lang="it-IT" sz="3200" dirty="0"/>
+              <a:t> the datasets and </a:t>
+            </a:r>
+            <a:r>
+              <a:rPr lang="it-IT" sz="3200" dirty="0" err="1"/>
+              <a:t>deal</a:t>
+            </a:r>
+            <a:r>
+              <a:rPr lang="it-IT" sz="3200" dirty="0"/>
+              <a:t> with </a:t>
+            </a:r>
+            <a:r>
+              <a:rPr lang="it-IT" sz="3200" dirty="0" err="1"/>
+              <a:t>missing</a:t>
+            </a:r>
+            <a:r>
+              <a:rPr lang="it-IT" sz="3200" dirty="0"/>
+              <a:t> </a:t>
+            </a:r>
+            <a:r>
+              <a:rPr lang="it-IT" sz="3200" dirty="0" err="1"/>
+              <a:t>values</a:t>
+            </a:r>
+            <a:endParaRPr lang="it-IT" sz="3200" dirty="0"/>
+          </a:p>
+          <a:p>
+            <a:pPr>
+              <a:buFont typeface="Wingdings" panose="05000000000000000000" pitchFamily="2" charset="2"/>
+              <a:buChar char="§"/>
+            </a:pPr>
+            <a:r>
+              <a:rPr lang="it-IT" sz="3200" dirty="0"/>
+              <a:t>Merge speed, </a:t>
+            </a:r>
+            <a:r>
+              <a:rPr lang="it-IT" sz="3200" dirty="0" err="1"/>
+              <a:t>sensors</a:t>
+            </a:r>
+            <a:r>
+              <a:rPr lang="it-IT" sz="3200" dirty="0"/>
+              <a:t>, events and </a:t>
+            </a:r>
+            <a:r>
+              <a:rPr lang="it-IT" sz="3200" dirty="0" err="1"/>
+              <a:t>weather</a:t>
+            </a:r>
+            <a:r>
+              <a:rPr lang="it-IT" sz="3200" dirty="0"/>
+              <a:t> </a:t>
+            </a:r>
+            <a:r>
+              <a:rPr lang="it-IT" sz="3200" dirty="0" err="1"/>
+              <a:t>into</a:t>
+            </a:r>
+            <a:r>
+              <a:rPr lang="it-IT" sz="3200" dirty="0"/>
+              <a:t> a single dataset </a:t>
+            </a:r>
+            <a:r>
+              <a:rPr lang="it-IT" sz="3200" dirty="0" err="1"/>
+              <a:t>dealing</a:t>
+            </a:r>
+            <a:r>
+              <a:rPr lang="it-IT" sz="3200" dirty="0"/>
+              <a:t> with </a:t>
+            </a:r>
+            <a:r>
+              <a:rPr lang="it-IT" sz="3200" dirty="0" err="1"/>
+              <a:t>simultaneous</a:t>
+            </a:r>
+            <a:r>
+              <a:rPr lang="it-IT" sz="3200" dirty="0"/>
+              <a:t> events</a:t>
+            </a:r>
+          </a:p>
+          <a:p>
+            <a:pPr>
+              <a:buFont typeface="Wingdings" panose="05000000000000000000" pitchFamily="2" charset="2"/>
+              <a:buChar char="§"/>
+            </a:pPr>
+            <a:r>
+              <a:rPr lang="it-IT" sz="3200" dirty="0" err="1"/>
+              <a:t>Encode</a:t>
+            </a:r>
+            <a:r>
+              <a:rPr lang="it-IT" sz="3200" dirty="0"/>
+              <a:t> in a </a:t>
+            </a:r>
+            <a:r>
+              <a:rPr lang="it-IT" sz="3200" dirty="0" err="1"/>
+              <a:t>different</a:t>
+            </a:r>
+            <a:r>
+              <a:rPr lang="it-IT" sz="3200" dirty="0"/>
+              <a:t> way the events and the </a:t>
+            </a:r>
+            <a:r>
+              <a:rPr lang="it-IT" sz="3200" dirty="0" err="1"/>
+              <a:t>weather</a:t>
+            </a:r>
+            <a:r>
+              <a:rPr lang="it-IT" sz="3200" dirty="0"/>
+              <a:t> </a:t>
+            </a:r>
+            <a:r>
+              <a:rPr lang="it-IT" sz="3200" dirty="0" err="1"/>
+              <a:t>conditions</a:t>
+            </a:r>
+            <a:r>
+              <a:rPr lang="it-IT" sz="3200" dirty="0"/>
+              <a:t> (one-hot-</a:t>
+            </a:r>
+            <a:r>
+              <a:rPr lang="it-IT" sz="3200" dirty="0" err="1"/>
+              <a:t>encoding</a:t>
+            </a:r>
+            <a:r>
+              <a:rPr lang="it-IT" sz="3200" dirty="0"/>
+              <a:t>)</a:t>
+            </a:r>
+          </a:p>
+          <a:p>
+            <a:pPr>
+              <a:buFont typeface="Wingdings" panose="05000000000000000000" pitchFamily="2" charset="2"/>
+              <a:buChar char="§"/>
+            </a:pPr>
+            <a:r>
+              <a:rPr lang="it-IT" sz="3200" dirty="0" err="1"/>
+              <a:t>Remove</a:t>
+            </a:r>
+            <a:r>
+              <a:rPr lang="it-IT" sz="3200" dirty="0"/>
+              <a:t> </a:t>
+            </a:r>
+            <a:r>
+              <a:rPr lang="it-IT" sz="3200" dirty="0" err="1"/>
+              <a:t>reduntants</a:t>
+            </a:r>
+            <a:r>
+              <a:rPr lang="it-IT" sz="3200" dirty="0"/>
+              <a:t> features</a:t>
+            </a:r>
           </a:p>
         </p:txBody>
       </p:sp>
@@ -20931,10 +21088,95 @@
         </p:nvSpPr>
         <p:spPr/>
         <p:txBody>
-          <a:bodyPr/>
+          <a:bodyPr>
+            <a:normAutofit/>
+          </a:bodyPr>
           <a:lstStyle/>
           <a:p>
-            <a:endParaRPr lang="it-IT" dirty="0"/>
+            <a:pPr>
+              <a:buFont typeface="Wingdings" panose="05000000000000000000" pitchFamily="2" charset="2"/>
+              <a:buChar char="§"/>
+            </a:pPr>
+            <a:r>
+              <a:rPr lang="it-IT" sz="3600" dirty="0"/>
+              <a:t>One model for </a:t>
+            </a:r>
+            <a:r>
+              <a:rPr lang="it-IT" sz="3600" dirty="0" err="1"/>
+              <a:t>each</a:t>
+            </a:r>
+            <a:r>
+              <a:rPr lang="it-IT" sz="3600" dirty="0"/>
+              <a:t> </a:t>
+            </a:r>
+            <a:r>
+              <a:rPr lang="it-IT" sz="3600" dirty="0" err="1"/>
+              <a:t>sensor</a:t>
+            </a:r>
+            <a:r>
+              <a:rPr lang="it-IT" sz="3600" dirty="0"/>
+              <a:t> for the </a:t>
+            </a:r>
+            <a:r>
+              <a:rPr lang="it-IT" sz="3600" dirty="0" err="1"/>
+              <a:t>prediction</a:t>
+            </a:r>
+            <a:endParaRPr lang="it-IT" sz="3600" dirty="0"/>
+          </a:p>
+          <a:p>
+            <a:pPr>
+              <a:buFont typeface="Wingdings" panose="05000000000000000000" pitchFamily="2" charset="2"/>
+              <a:buChar char="§"/>
+            </a:pPr>
+            <a:r>
+              <a:rPr lang="it-IT" sz="3600" dirty="0" err="1"/>
+              <a:t>Normalization</a:t>
+            </a:r>
+            <a:r>
+              <a:rPr lang="it-IT" sz="3600" dirty="0"/>
+              <a:t> of the data</a:t>
+            </a:r>
+          </a:p>
+          <a:p>
+            <a:pPr>
+              <a:buFont typeface="Wingdings" panose="05000000000000000000" pitchFamily="2" charset="2"/>
+              <a:buChar char="§"/>
+            </a:pPr>
+            <a:r>
+              <a:rPr lang="it-IT" sz="3600" dirty="0"/>
+              <a:t>PCA</a:t>
+            </a:r>
+          </a:p>
+          <a:p>
+            <a:pPr>
+              <a:buFont typeface="Wingdings" panose="05000000000000000000" pitchFamily="2" charset="2"/>
+              <a:buChar char="§"/>
+            </a:pPr>
+            <a:r>
+              <a:rPr lang="it-IT" sz="3600" dirty="0"/>
+              <a:t>Conversion of the data </a:t>
+            </a:r>
+            <a:r>
+              <a:rPr lang="it-IT" sz="3600" dirty="0" err="1"/>
+              <a:t>into</a:t>
+            </a:r>
+            <a:r>
+              <a:rPr lang="it-IT" sz="3600" dirty="0"/>
+              <a:t> a </a:t>
+            </a:r>
+            <a:r>
+              <a:rPr lang="it-IT" sz="3600" dirty="0" err="1"/>
+              <a:t>supervised</a:t>
+            </a:r>
+            <a:r>
+              <a:rPr lang="it-IT" sz="3600" dirty="0"/>
+              <a:t> learning </a:t>
+            </a:r>
+            <a:r>
+              <a:rPr lang="it-IT" sz="3600" dirty="0" err="1"/>
+              <a:t>problem</a:t>
+            </a:r>
+            <a:endParaRPr lang="it-IT" sz="3600" dirty="0"/>
           </a:p>
         </p:txBody>
       </p:sp>
@@ -20990,28 +21232,8 @@
           <a:lstStyle/>
           <a:p>
             <a:r>
-              <a:rPr lang="it-IT" dirty="0" err="1"/>
-              <a:t>Lstm</a:t>
-            </a:r>
-            <a:r>
               <a:rPr lang="it-IT" dirty="0"/>
-              <a:t> </a:t>
-            </a:r>
-            <a:r>
-              <a:rPr lang="it-IT" dirty="0" err="1"/>
-              <a:t>recurrent</a:t>
-            </a:r>
-            <a:r>
-              <a:rPr lang="it-IT" dirty="0"/>
-              <a:t> </a:t>
-            </a:r>
-            <a:r>
-              <a:rPr lang="it-IT" dirty="0" err="1"/>
-              <a:t>neural</a:t>
-            </a:r>
-            <a:r>
-              <a:rPr lang="it-IT" dirty="0"/>
-              <a:t> network</a:t>
+              <a:t>LONG SHORT-TERM MEMORY (LSTM)</a:t>
             </a:r>
           </a:p>
         </p:txBody>
@@ -21063,13 +21285,90 @@
         </p:nvSpPr>
         <p:spPr>
           <a:xfrm>
-            <a:off x="618978" y="2091866"/>
+            <a:off x="618978" y="2280373"/>
             <a:ext cx="5160030" cy="4023360"/>
           </a:xfrm>
         </p:spPr>
         <p:txBody>
           <a:bodyPr/>
           <a:lstStyle/>
+          <a:p>
+            <a:pPr>
+              <a:buFont typeface="Wingdings" panose="05000000000000000000" pitchFamily="2" charset="2"/>
+              <a:buChar char="§"/>
+            </a:pPr>
+            <a:r>
+              <a:rPr lang="it-IT" sz="3200" dirty="0" err="1"/>
+              <a:t>Recurrent</a:t>
+            </a:r>
+            <a:r>
+              <a:rPr lang="it-IT" sz="3200" dirty="0"/>
+              <a:t> </a:t>
+            </a:r>
+            <a:r>
+              <a:rPr lang="it-IT" sz="3200" dirty="0" err="1"/>
+              <a:t>neural</a:t>
+            </a:r>
+            <a:r>
+              <a:rPr lang="it-IT" sz="3200" dirty="0"/>
+              <a:t> networks       </a:t>
+            </a:r>
+            <a:r>
+              <a:rPr lang="it-IT" sz="3200" dirty="0" err="1"/>
+              <a:t>structure</a:t>
+            </a:r>
+            <a:endParaRPr lang="it-IT" sz="3200" dirty="0"/>
+          </a:p>
+          <a:p>
+            <a:pPr>
+              <a:buFont typeface="Wingdings" panose="05000000000000000000" pitchFamily="2" charset="2"/>
+              <a:buChar char="§"/>
+            </a:pPr>
+            <a:r>
+              <a:rPr lang="it-IT" sz="3200" dirty="0" err="1"/>
+              <a:t>Suitable</a:t>
+            </a:r>
+            <a:r>
+              <a:rPr lang="it-IT" sz="3200" dirty="0"/>
+              <a:t> for multivariate multi-steps time </a:t>
+            </a:r>
+            <a:r>
+              <a:rPr lang="it-IT" sz="3200" dirty="0" err="1"/>
+              <a:t>series</a:t>
+            </a:r>
+            <a:r>
+              <a:rPr lang="it-IT" sz="3200" dirty="0"/>
+              <a:t> </a:t>
+            </a:r>
+            <a:r>
+              <a:rPr lang="it-IT" sz="3200" dirty="0" err="1"/>
+              <a:t>prediction</a:t>
+            </a:r>
+            <a:endParaRPr lang="it-IT" sz="3200" dirty="0"/>
+          </a:p>
+          <a:p>
+            <a:pPr>
+              <a:buFont typeface="Wingdings" panose="05000000000000000000" pitchFamily="2" charset="2"/>
+              <a:buChar char="§"/>
+            </a:pPr>
+            <a:r>
+              <a:rPr lang="it-IT" sz="3200" dirty="0"/>
+              <a:t>Framework </a:t>
+            </a:r>
+            <a:r>
+              <a:rPr lang="it-IT" sz="3200" dirty="0" err="1"/>
+              <a:t>used</a:t>
+            </a:r>
+            <a:r>
+              <a:rPr lang="it-IT" sz="3200" dirty="0"/>
+              <a:t>: </a:t>
+            </a:r>
+            <a:r>
+              <a:rPr lang="it-IT" sz="3200" dirty="0" err="1"/>
+              <a:t>Keras</a:t>
+            </a:r>
+            <a:endParaRPr lang="it-IT" sz="3200" dirty="0"/>
+          </a:p>
           <a:p>
             <a:endParaRPr lang="it-IT" dirty="0"/>
           </a:p>

</xml_diff>